<commit_message>
Update Project Application Development 1.2.pptx
</commit_message>
<xml_diff>
--- a/Paper Work/Presentation/Project Application Development 1.2.pptx
+++ b/Paper Work/Presentation/Project Application Development 1.2.pptx
@@ -5986,8 +5986,8 @@
         </p:blipFill>
         <p:spPr>
           <a:xfrm>
-            <a:off x="1669785" y="870052"/>
-            <a:ext cx="6488642" cy="5302148"/>
+            <a:off x="938404" y="1051868"/>
+            <a:ext cx="7345500" cy="4943491"/>
           </a:xfrm>
           <a:prstGeom prst="rect">
             <a:avLst/>

</xml_diff>